<commit_message>
updating the ImSwitch windows installation
</commit_message>
<xml_diff>
--- a/figures/UC2_Lightsheet.pptx
+++ b/figures/UC2_Lightsheet.pptx
@@ -9014,7 +9014,7 @@
         </p:nvSpPr>
         <p:spPr>
           <a:xfrm>
-            <a:off x="9077941" y="1343425"/>
+            <a:off x="9059917" y="1343425"/>
             <a:ext cx="1454244" cy="369332"/>
           </a:xfrm>
           <a:prstGeom prst="rect">
@@ -9052,7 +9052,7 @@
         </p:nvSpPr>
         <p:spPr>
           <a:xfrm>
-            <a:off x="9059917" y="1986437"/>
+            <a:off x="9059917" y="2016270"/>
             <a:ext cx="1646605" cy="369332"/>
           </a:xfrm>
           <a:prstGeom prst="rect">
@@ -9389,7 +9389,7 @@
         </p:nvSpPr>
         <p:spPr>
           <a:xfrm>
-            <a:off x="9059917" y="3314260"/>
+            <a:off x="9059917" y="3361960"/>
             <a:ext cx="1125052" cy="369332"/>
           </a:xfrm>
           <a:prstGeom prst="rect">
@@ -9431,7 +9431,7 @@
         </p:nvSpPr>
         <p:spPr>
           <a:xfrm>
-            <a:off x="9059917" y="2593717"/>
+            <a:off x="9059917" y="2689115"/>
             <a:ext cx="2146742" cy="369332"/>
           </a:xfrm>
           <a:prstGeom prst="rect">
@@ -10023,13 +10023,14 @@
           </p:cNvPr>
           <p:cNvCxnSpPr>
             <a:cxnSpLocks/>
+            <a:endCxn id="18" idx="1"/>
           </p:cNvCxnSpPr>
           <p:nvPr/>
         </p:nvCxnSpPr>
         <p:spPr>
           <a:xfrm flipV="1">
-            <a:off x="6340858" y="2807451"/>
-            <a:ext cx="2719059" cy="1227352"/>
+            <a:off x="6340858" y="2873781"/>
+            <a:ext cx="2719059" cy="1161022"/>
           </a:xfrm>
           <a:prstGeom prst="line">
             <a:avLst/>
@@ -10160,7 +10161,7 @@
         <p:spPr>
           <a:xfrm flipV="1">
             <a:off x="7986713" y="1528091"/>
-            <a:ext cx="1091228" cy="422614"/>
+            <a:ext cx="1073204" cy="422614"/>
           </a:xfrm>
           <a:prstGeom prst="line">
             <a:avLst/>
@@ -10197,13 +10198,14 @@
           </p:cNvPr>
           <p:cNvCxnSpPr>
             <a:cxnSpLocks/>
+            <a:endCxn id="10" idx="1"/>
           </p:cNvCxnSpPr>
           <p:nvPr/>
         </p:nvCxnSpPr>
         <p:spPr>
           <a:xfrm flipV="1">
-            <a:off x="6856847" y="2281203"/>
-            <a:ext cx="2100207" cy="893153"/>
+            <a:off x="6856847" y="2200936"/>
+            <a:ext cx="2203070" cy="973420"/>
           </a:xfrm>
           <a:prstGeom prst="line">
             <a:avLst/>

</xml_diff>